<commit_message>
All VDM tutorials and the user manual should now be ready for the 1.0.0 release
git-svn-id: https://overture.svn.sourceforge.net/svnroot/overture/trunk@2556 2b2d4d09-c93c-414a-ad04-6e973f5c1cff
</commit_message>
<xml_diff>
--- a/documentation/tutorials/VDMRTOvertureTutorial/figures/OvertureAndDebuggingPerspective.pptx
+++ b/documentation/tutorials/VDMRTOvertureTutorial/figures/OvertureAndDebuggingPerspective.pptx
@@ -292,7 +292,7 @@
             <a:fld id="{6C9C7907-59E3-4B00-BADD-F3C6AE052768}" type="datetimeFigureOut">
               <a:rPr lang="da-DK" smtClean="0"/>
               <a:pPr/>
-              <a:t>03-01-2010</a:t>
+              <a:t>19-02-2011</a:t>
             </a:fld>
             <a:endParaRPr lang="da-DK"/>
           </a:p>
@@ -335,7 +335,7 @@
             <a:fld id="{78AD4C09-F243-4A95-8351-89FCE95C2157}" type="slidenum">
               <a:rPr lang="da-DK" smtClean="0"/>
               <a:pPr/>
-              <a:t>‹nr.›</a:t>
+              <a:t>‹#›</a:t>
             </a:fld>
             <a:endParaRPr lang="da-DK"/>
           </a:p>
@@ -459,7 +459,7 @@
             <a:fld id="{6C9C7907-59E3-4B00-BADD-F3C6AE052768}" type="datetimeFigureOut">
               <a:rPr lang="da-DK" smtClean="0"/>
               <a:pPr/>
-              <a:t>03-01-2010</a:t>
+              <a:t>19-02-2011</a:t>
             </a:fld>
             <a:endParaRPr lang="da-DK"/>
           </a:p>
@@ -502,7 +502,7 @@
             <a:fld id="{78AD4C09-F243-4A95-8351-89FCE95C2157}" type="slidenum">
               <a:rPr lang="da-DK" smtClean="0"/>
               <a:pPr/>
-              <a:t>‹nr.›</a:t>
+              <a:t>‹#›</a:t>
             </a:fld>
             <a:endParaRPr lang="da-DK"/>
           </a:p>
@@ -636,7 +636,7 @@
             <a:fld id="{6C9C7907-59E3-4B00-BADD-F3C6AE052768}" type="datetimeFigureOut">
               <a:rPr lang="da-DK" smtClean="0"/>
               <a:pPr/>
-              <a:t>03-01-2010</a:t>
+              <a:t>19-02-2011</a:t>
             </a:fld>
             <a:endParaRPr lang="da-DK"/>
           </a:p>
@@ -679,7 +679,7 @@
             <a:fld id="{78AD4C09-F243-4A95-8351-89FCE95C2157}" type="slidenum">
               <a:rPr lang="da-DK" smtClean="0"/>
               <a:pPr/>
-              <a:t>‹nr.›</a:t>
+              <a:t>‹#›</a:t>
             </a:fld>
             <a:endParaRPr lang="da-DK"/>
           </a:p>
@@ -803,7 +803,7 @@
             <a:fld id="{6C9C7907-59E3-4B00-BADD-F3C6AE052768}" type="datetimeFigureOut">
               <a:rPr lang="da-DK" smtClean="0"/>
               <a:pPr/>
-              <a:t>03-01-2010</a:t>
+              <a:t>19-02-2011</a:t>
             </a:fld>
             <a:endParaRPr lang="da-DK"/>
           </a:p>
@@ -846,7 +846,7 @@
             <a:fld id="{78AD4C09-F243-4A95-8351-89FCE95C2157}" type="slidenum">
               <a:rPr lang="da-DK" smtClean="0"/>
               <a:pPr/>
-              <a:t>‹nr.›</a:t>
+              <a:t>‹#›</a:t>
             </a:fld>
             <a:endParaRPr lang="da-DK"/>
           </a:p>
@@ -1046,7 +1046,7 @@
             <a:fld id="{6C9C7907-59E3-4B00-BADD-F3C6AE052768}" type="datetimeFigureOut">
               <a:rPr lang="da-DK" smtClean="0"/>
               <a:pPr/>
-              <a:t>03-01-2010</a:t>
+              <a:t>19-02-2011</a:t>
             </a:fld>
             <a:endParaRPr lang="da-DK"/>
           </a:p>
@@ -1089,7 +1089,7 @@
             <a:fld id="{78AD4C09-F243-4A95-8351-89FCE95C2157}" type="slidenum">
               <a:rPr lang="da-DK" smtClean="0"/>
               <a:pPr/>
-              <a:t>‹nr.›</a:t>
+              <a:t>‹#›</a:t>
             </a:fld>
             <a:endParaRPr lang="da-DK"/>
           </a:p>
@@ -1331,7 +1331,7 @@
             <a:fld id="{6C9C7907-59E3-4B00-BADD-F3C6AE052768}" type="datetimeFigureOut">
               <a:rPr lang="da-DK" smtClean="0"/>
               <a:pPr/>
-              <a:t>03-01-2010</a:t>
+              <a:t>19-02-2011</a:t>
             </a:fld>
             <a:endParaRPr lang="da-DK"/>
           </a:p>
@@ -1374,7 +1374,7 @@
             <a:fld id="{78AD4C09-F243-4A95-8351-89FCE95C2157}" type="slidenum">
               <a:rPr lang="da-DK" smtClean="0"/>
               <a:pPr/>
-              <a:t>‹nr.›</a:t>
+              <a:t>‹#›</a:t>
             </a:fld>
             <a:endParaRPr lang="da-DK"/>
           </a:p>
@@ -1750,7 +1750,7 @@
             <a:fld id="{6C9C7907-59E3-4B00-BADD-F3C6AE052768}" type="datetimeFigureOut">
               <a:rPr lang="da-DK" smtClean="0"/>
               <a:pPr/>
-              <a:t>03-01-2010</a:t>
+              <a:t>19-02-2011</a:t>
             </a:fld>
             <a:endParaRPr lang="da-DK"/>
           </a:p>
@@ -1793,7 +1793,7 @@
             <a:fld id="{78AD4C09-F243-4A95-8351-89FCE95C2157}" type="slidenum">
               <a:rPr lang="da-DK" smtClean="0"/>
               <a:pPr/>
-              <a:t>‹nr.›</a:t>
+              <a:t>‹#›</a:t>
             </a:fld>
             <a:endParaRPr lang="da-DK"/>
           </a:p>
@@ -1865,7 +1865,7 @@
             <a:fld id="{6C9C7907-59E3-4B00-BADD-F3C6AE052768}" type="datetimeFigureOut">
               <a:rPr lang="da-DK" smtClean="0"/>
               <a:pPr/>
-              <a:t>03-01-2010</a:t>
+              <a:t>19-02-2011</a:t>
             </a:fld>
             <a:endParaRPr lang="da-DK"/>
           </a:p>
@@ -1908,7 +1908,7 @@
             <a:fld id="{78AD4C09-F243-4A95-8351-89FCE95C2157}" type="slidenum">
               <a:rPr lang="da-DK" smtClean="0"/>
               <a:pPr/>
-              <a:t>‹nr.›</a:t>
+              <a:t>‹#›</a:t>
             </a:fld>
             <a:endParaRPr lang="da-DK"/>
           </a:p>
@@ -1957,7 +1957,7 @@
             <a:fld id="{6C9C7907-59E3-4B00-BADD-F3C6AE052768}" type="datetimeFigureOut">
               <a:rPr lang="da-DK" smtClean="0"/>
               <a:pPr/>
-              <a:t>03-01-2010</a:t>
+              <a:t>19-02-2011</a:t>
             </a:fld>
             <a:endParaRPr lang="da-DK"/>
           </a:p>
@@ -2000,7 +2000,7 @@
             <a:fld id="{78AD4C09-F243-4A95-8351-89FCE95C2157}" type="slidenum">
               <a:rPr lang="da-DK" smtClean="0"/>
               <a:pPr/>
-              <a:t>‹nr.›</a:t>
+              <a:t>‹#›</a:t>
             </a:fld>
             <a:endParaRPr lang="da-DK"/>
           </a:p>
@@ -2231,7 +2231,7 @@
             <a:fld id="{6C9C7907-59E3-4B00-BADD-F3C6AE052768}" type="datetimeFigureOut">
               <a:rPr lang="da-DK" smtClean="0"/>
               <a:pPr/>
-              <a:t>03-01-2010</a:t>
+              <a:t>19-02-2011</a:t>
             </a:fld>
             <a:endParaRPr lang="da-DK"/>
           </a:p>
@@ -2274,7 +2274,7 @@
             <a:fld id="{78AD4C09-F243-4A95-8351-89FCE95C2157}" type="slidenum">
               <a:rPr lang="da-DK" smtClean="0"/>
               <a:pPr/>
-              <a:t>‹nr.›</a:t>
+              <a:t>‹#›</a:t>
             </a:fld>
             <a:endParaRPr lang="da-DK"/>
           </a:p>
@@ -2481,7 +2481,7 @@
             <a:fld id="{6C9C7907-59E3-4B00-BADD-F3C6AE052768}" type="datetimeFigureOut">
               <a:rPr lang="da-DK" smtClean="0"/>
               <a:pPr/>
-              <a:t>03-01-2010</a:t>
+              <a:t>19-02-2011</a:t>
             </a:fld>
             <a:endParaRPr lang="da-DK"/>
           </a:p>
@@ -2524,7 +2524,7 @@
             <a:fld id="{78AD4C09-F243-4A95-8351-89FCE95C2157}" type="slidenum">
               <a:rPr lang="da-DK" smtClean="0"/>
               <a:pPr/>
-              <a:t>‹nr.›</a:t>
+              <a:t>‹#›</a:t>
             </a:fld>
             <a:endParaRPr lang="da-DK"/>
           </a:p>
@@ -2691,7 +2691,7 @@
             <a:fld id="{6C9C7907-59E3-4B00-BADD-F3C6AE052768}" type="datetimeFigureOut">
               <a:rPr lang="da-DK" smtClean="0"/>
               <a:pPr/>
-              <a:t>03-01-2010</a:t>
+              <a:t>19-02-2011</a:t>
             </a:fld>
             <a:endParaRPr lang="da-DK"/>
           </a:p>
@@ -2770,7 +2770,7 @@
             <a:fld id="{78AD4C09-F243-4A95-8351-89FCE95C2157}" type="slidenum">
               <a:rPr lang="da-DK" smtClean="0"/>
               <a:pPr/>
-              <a:t>‹nr.›</a:t>
+              <a:t>‹#›</a:t>
             </a:fld>
             <a:endParaRPr lang="da-DK"/>
           </a:p>
@@ -3822,34 +3822,32 @@
       </p:grpSpPr>
       <p:pic>
         <p:nvPicPr>
-          <p:cNvPr id="2" name="Picture 2"/>
+          <p:cNvPr id="3" name="Picture 2"/>
           <p:cNvPicPr>
-            <a:picLocks noChangeAspect="1" noChangeArrowheads="1"/>
+            <a:picLocks noChangeAspect="1"/>
           </p:cNvPicPr>
           <p:nvPr/>
         </p:nvPicPr>
         <p:blipFill>
-          <a:blip r:embed="rId2" cstate="print"/>
-          <a:srcRect/>
+          <a:blip r:embed="rId2">
+            <a:extLst>
+              <a:ext uri="{28A0092B-C50C-407E-A947-70E740481C1C}">
+                <a14:useLocalDpi xmlns:a14="http://schemas.microsoft.com/office/drawing/2010/main" val="0"/>
+              </a:ext>
+            </a:extLst>
+          </a:blip>
           <a:stretch>
             <a:fillRect/>
           </a:stretch>
         </p:blipFill>
-        <p:spPr bwMode="auto">
+        <p:spPr>
           <a:xfrm>
-            <a:off x="0" y="0"/>
-            <a:ext cx="13716000" cy="8029575"/>
+            <a:off x="0" y="720859"/>
+            <a:ext cx="9144000" cy="5416281"/>
           </a:xfrm>
           <a:prstGeom prst="rect">
             <a:avLst/>
           </a:prstGeom>
-          <a:noFill/>
-          <a:ln w="9525">
-            <a:noFill/>
-            <a:miter lim="800000"/>
-            <a:headEnd/>
-            <a:tailEnd/>
-          </a:ln>
         </p:spPr>
       </p:pic>
       <p:sp>
@@ -3860,13 +3858,13 @@
         </p:nvSpPr>
         <p:spPr>
           <a:xfrm>
-            <a:off x="1714480" y="785794"/>
+            <a:off x="714348" y="1393017"/>
             <a:ext cx="1000132" cy="357190"/>
           </a:xfrm>
           <a:prstGeom prst="wedgeRectCallout">
             <a:avLst>
               <a:gd name="adj1" fmla="val -90581"/>
-              <a:gd name="adj2" fmla="val 21742"/>
+              <a:gd name="adj2" fmla="val 58313"/>
             </a:avLst>
           </a:prstGeom>
           <a:solidFill>
@@ -3908,7 +3906,7 @@
         </p:nvSpPr>
         <p:spPr>
           <a:xfrm>
-            <a:off x="1714480" y="1714488"/>
+            <a:off x="500034" y="4293096"/>
             <a:ext cx="1428760" cy="357190"/>
           </a:xfrm>
           <a:prstGeom prst="wedgeRectCallout">
@@ -3953,7 +3951,7 @@
         </p:nvSpPr>
         <p:spPr>
           <a:xfrm>
-            <a:off x="7072330" y="1571612"/>
+            <a:off x="5857884" y="3250404"/>
             <a:ext cx="1000132" cy="357190"/>
           </a:xfrm>
           <a:prstGeom prst="wedgeRectCallout">
@@ -3998,7 +3996,7 @@
         </p:nvSpPr>
         <p:spPr>
           <a:xfrm>
-            <a:off x="10715668" y="3286124"/>
+            <a:off x="7572396" y="3071013"/>
             <a:ext cx="1357322" cy="357190"/>
           </a:xfrm>
           <a:prstGeom prst="wedgeRectCallout">
@@ -4051,7 +4049,7 @@
         </p:nvSpPr>
         <p:spPr>
           <a:xfrm>
-            <a:off x="6000760" y="6500810"/>
+            <a:off x="2123728" y="4941168"/>
             <a:ext cx="1500198" cy="357190"/>
           </a:xfrm>
           <a:prstGeom prst="wedgeRectCallout">
@@ -4100,7 +4098,7 @@
         </p:nvSpPr>
         <p:spPr>
           <a:xfrm>
-            <a:off x="6858016" y="142852"/>
+            <a:off x="4762087" y="977770"/>
             <a:ext cx="2071702" cy="357190"/>
           </a:xfrm>
           <a:prstGeom prst="wedgeRectCallout">
@@ -4168,34 +4166,32 @@
       </p:grpSpPr>
       <p:pic>
         <p:nvPicPr>
-          <p:cNvPr id="2" name="Picture 2"/>
+          <p:cNvPr id="3" name="Picture 2"/>
           <p:cNvPicPr>
-            <a:picLocks noChangeAspect="1" noChangeArrowheads="1"/>
+            <a:picLocks noChangeAspect="1"/>
           </p:cNvPicPr>
           <p:nvPr/>
         </p:nvPicPr>
         <p:blipFill>
-          <a:blip r:embed="rId2" cstate="print"/>
-          <a:srcRect/>
+          <a:blip r:embed="rId2">
+            <a:extLst>
+              <a:ext uri="{28A0092B-C50C-407E-A947-70E740481C1C}">
+                <a14:useLocalDpi xmlns:a14="http://schemas.microsoft.com/office/drawing/2010/main" val="0"/>
+              </a:ext>
+            </a:extLst>
+          </a:blip>
           <a:stretch>
             <a:fillRect/>
           </a:stretch>
         </p:blipFill>
-        <p:spPr bwMode="auto">
+        <p:spPr>
           <a:xfrm>
-            <a:off x="0" y="0"/>
-            <a:ext cx="13716000" cy="8029575"/>
+            <a:off x="0" y="724436"/>
+            <a:ext cx="9144000" cy="5409127"/>
           </a:xfrm>
           <a:prstGeom prst="rect">
             <a:avLst/>
           </a:prstGeom>
-          <a:noFill/>
-          <a:ln w="9525">
-            <a:noFill/>
-            <a:miter lim="800000"/>
-            <a:headEnd/>
-            <a:tailEnd/>
-          </a:ln>
         </p:spPr>
       </p:pic>
       <p:sp>
@@ -4206,7 +4202,7 @@
         </p:nvSpPr>
         <p:spPr>
           <a:xfrm>
-            <a:off x="4071934" y="1428736"/>
+            <a:off x="2021373" y="1428736"/>
             <a:ext cx="2071702" cy="428628"/>
           </a:xfrm>
           <a:prstGeom prst="wedgeRectCallout">
@@ -4285,7 +4281,7 @@
         </p:nvSpPr>
         <p:spPr>
           <a:xfrm>
-            <a:off x="7358082" y="2071678"/>
+            <a:off x="6202420" y="2238584"/>
             <a:ext cx="2071702" cy="428628"/>
           </a:xfrm>
           <a:prstGeom prst="wedgeRectCallout">
@@ -4419,7 +4415,7 @@
         </p:nvSpPr>
         <p:spPr>
           <a:xfrm>
-            <a:off x="2214546" y="6643686"/>
+            <a:off x="2214546" y="5085184"/>
             <a:ext cx="2071702" cy="428628"/>
           </a:xfrm>
           <a:prstGeom prst="wedgeRectCallout">
@@ -4498,7 +4494,7 @@
         </p:nvSpPr>
         <p:spPr>
           <a:xfrm>
-            <a:off x="11001420" y="4143380"/>
+            <a:off x="7740352" y="3929066"/>
             <a:ext cx="1000132" cy="428628"/>
           </a:xfrm>
           <a:prstGeom prst="wedgeRectCallout">

</xml_diff>

<commit_message>
Last round of updating of tutorials for release 1.0.0
git-svn-id: https://overture.svn.sourceforge.net/svnroot/overture/trunk@2586 2b2d4d09-c93c-414a-ad04-6e973f5c1cff
</commit_message>
<xml_diff>
--- a/documentation/tutorials/VDMRTOvertureTutorial/figures/OvertureAndDebuggingPerspective.pptx
+++ b/documentation/tutorials/VDMRTOvertureTutorial/figures/OvertureAndDebuggingPerspective.pptx
@@ -292,7 +292,7 @@
             <a:fld id="{6C9C7907-59E3-4B00-BADD-F3C6AE052768}" type="datetimeFigureOut">
               <a:rPr lang="da-DK" smtClean="0"/>
               <a:pPr/>
-              <a:t>19-02-2011</a:t>
+              <a:t>26-02-2011</a:t>
             </a:fld>
             <a:endParaRPr lang="da-DK"/>
           </a:p>
@@ -459,7 +459,7 @@
             <a:fld id="{6C9C7907-59E3-4B00-BADD-F3C6AE052768}" type="datetimeFigureOut">
               <a:rPr lang="da-DK" smtClean="0"/>
               <a:pPr/>
-              <a:t>19-02-2011</a:t>
+              <a:t>26-02-2011</a:t>
             </a:fld>
             <a:endParaRPr lang="da-DK"/>
           </a:p>
@@ -636,7 +636,7 @@
             <a:fld id="{6C9C7907-59E3-4B00-BADD-F3C6AE052768}" type="datetimeFigureOut">
               <a:rPr lang="da-DK" smtClean="0"/>
               <a:pPr/>
-              <a:t>19-02-2011</a:t>
+              <a:t>26-02-2011</a:t>
             </a:fld>
             <a:endParaRPr lang="da-DK"/>
           </a:p>
@@ -803,7 +803,7 @@
             <a:fld id="{6C9C7907-59E3-4B00-BADD-F3C6AE052768}" type="datetimeFigureOut">
               <a:rPr lang="da-DK" smtClean="0"/>
               <a:pPr/>
-              <a:t>19-02-2011</a:t>
+              <a:t>26-02-2011</a:t>
             </a:fld>
             <a:endParaRPr lang="da-DK"/>
           </a:p>
@@ -1046,7 +1046,7 @@
             <a:fld id="{6C9C7907-59E3-4B00-BADD-F3C6AE052768}" type="datetimeFigureOut">
               <a:rPr lang="da-DK" smtClean="0"/>
               <a:pPr/>
-              <a:t>19-02-2011</a:t>
+              <a:t>26-02-2011</a:t>
             </a:fld>
             <a:endParaRPr lang="da-DK"/>
           </a:p>
@@ -1331,7 +1331,7 @@
             <a:fld id="{6C9C7907-59E3-4B00-BADD-F3C6AE052768}" type="datetimeFigureOut">
               <a:rPr lang="da-DK" smtClean="0"/>
               <a:pPr/>
-              <a:t>19-02-2011</a:t>
+              <a:t>26-02-2011</a:t>
             </a:fld>
             <a:endParaRPr lang="da-DK"/>
           </a:p>
@@ -1750,7 +1750,7 @@
             <a:fld id="{6C9C7907-59E3-4B00-BADD-F3C6AE052768}" type="datetimeFigureOut">
               <a:rPr lang="da-DK" smtClean="0"/>
               <a:pPr/>
-              <a:t>19-02-2011</a:t>
+              <a:t>26-02-2011</a:t>
             </a:fld>
             <a:endParaRPr lang="da-DK"/>
           </a:p>
@@ -1865,7 +1865,7 @@
             <a:fld id="{6C9C7907-59E3-4B00-BADD-F3C6AE052768}" type="datetimeFigureOut">
               <a:rPr lang="da-DK" smtClean="0"/>
               <a:pPr/>
-              <a:t>19-02-2011</a:t>
+              <a:t>26-02-2011</a:t>
             </a:fld>
             <a:endParaRPr lang="da-DK"/>
           </a:p>
@@ -1957,7 +1957,7 @@
             <a:fld id="{6C9C7907-59E3-4B00-BADD-F3C6AE052768}" type="datetimeFigureOut">
               <a:rPr lang="da-DK" smtClean="0"/>
               <a:pPr/>
-              <a:t>19-02-2011</a:t>
+              <a:t>26-02-2011</a:t>
             </a:fld>
             <a:endParaRPr lang="da-DK"/>
           </a:p>
@@ -2231,7 +2231,7 @@
             <a:fld id="{6C9C7907-59E3-4B00-BADD-F3C6AE052768}" type="datetimeFigureOut">
               <a:rPr lang="da-DK" smtClean="0"/>
               <a:pPr/>
-              <a:t>19-02-2011</a:t>
+              <a:t>26-02-2011</a:t>
             </a:fld>
             <a:endParaRPr lang="da-DK"/>
           </a:p>
@@ -2481,7 +2481,7 @@
             <a:fld id="{6C9C7907-59E3-4B00-BADD-F3C6AE052768}" type="datetimeFigureOut">
               <a:rPr lang="da-DK" smtClean="0"/>
               <a:pPr/>
-              <a:t>19-02-2011</a:t>
+              <a:t>26-02-2011</a:t>
             </a:fld>
             <a:endParaRPr lang="da-DK"/>
           </a:p>
@@ -2691,7 +2691,7 @@
             <a:fld id="{6C9C7907-59E3-4B00-BADD-F3C6AE052768}" type="datetimeFigureOut">
               <a:rPr lang="da-DK" smtClean="0"/>
               <a:pPr/>
-              <a:t>19-02-2011</a:t>
+              <a:t>26-02-2011</a:t>
             </a:fld>
             <a:endParaRPr lang="da-DK"/>
           </a:p>
@@ -4166,7 +4166,7 @@
       </p:grpSpPr>
       <p:pic>
         <p:nvPicPr>
-          <p:cNvPr id="3" name="Picture 2"/>
+          <p:cNvPr id="2" name="Picture 1"/>
           <p:cNvPicPr>
             <a:picLocks noChangeAspect="1"/>
           </p:cNvPicPr>
@@ -4186,8 +4186,8 @@
         </p:blipFill>
         <p:spPr>
           <a:xfrm>
-            <a:off x="0" y="724436"/>
-            <a:ext cx="9144000" cy="5409127"/>
+            <a:off x="0" y="691444"/>
+            <a:ext cx="9144000" cy="5475111"/>
           </a:xfrm>
           <a:prstGeom prst="rect">
             <a:avLst/>
@@ -4415,7 +4415,7 @@
         </p:nvSpPr>
         <p:spPr>
           <a:xfrm>
-            <a:off x="2214546" y="5085184"/>
+            <a:off x="2287164" y="5299498"/>
             <a:ext cx="2071702" cy="428628"/>
           </a:xfrm>
           <a:prstGeom prst="wedgeRectCallout">

</xml_diff>